<commit_message>
Update Review on Machine Learning Concepts.pptx
</commit_message>
<xml_diff>
--- a/1 - Generative vs Discriminative Models/Review on Machine Learning Concepts.pptx
+++ b/1 - Generative vs Discriminative Models/Review on Machine Learning Concepts.pptx
@@ -13140,9 +13140,8 @@
           </a:bodyPr>
           <a:lstStyle/>
           <a:p>
-            <a:pPr algn="l">
-              <a:buFont typeface="Wingdings" pitchFamily="2" charset="2"/>
-              <a:buChar char="§"/>
+            <a:pPr marL="0" indent="0" algn="l">
+              <a:buNone/>
             </a:pPr>
             <a:r>
               <a:rPr lang="en-PH" sz="3000" dirty="0"/>
@@ -13162,16 +13161,14 @@
             </a:r>
           </a:p>
           <a:p>
-            <a:pPr algn="l">
-              <a:buFont typeface="Wingdings" pitchFamily="2" charset="2"/>
-              <a:buChar char="§"/>
+            <a:pPr marL="0" indent="0" algn="l">
+              <a:buNone/>
             </a:pPr>
             <a:endParaRPr lang="en-PH" sz="3000" dirty="0"/>
           </a:p>
           <a:p>
-            <a:pPr algn="l">
-              <a:buFont typeface="Wingdings" pitchFamily="2" charset="2"/>
-              <a:buChar char="§"/>
+            <a:pPr marL="0" indent="0" algn="l">
+              <a:buNone/>
             </a:pPr>
             <a:r>
               <a:rPr lang="en-PH" sz="3000" dirty="0"/>
@@ -13284,7 +13281,7 @@
         <p:spPr>
           <a:xfrm>
             <a:off x="838199" y="2066736"/>
-            <a:ext cx="6112934" cy="4351338"/>
+            <a:ext cx="5664201" cy="4351338"/>
           </a:xfrm>
         </p:spPr>
         <p:txBody>
@@ -13293,9 +13290,8 @@
           </a:bodyPr>
           <a:lstStyle/>
           <a:p>
-            <a:pPr algn="l">
-              <a:buFont typeface="Wingdings" pitchFamily="2" charset="2"/>
-              <a:buChar char="§"/>
+            <a:pPr marL="0" indent="0" algn="l">
+              <a:buNone/>
             </a:pPr>
             <a:r>
               <a:rPr lang="en-PH" sz="3000" dirty="0"/>
@@ -13311,9 +13307,8 @@
             </a:r>
           </a:p>
           <a:p>
-            <a:pPr algn="l">
-              <a:buFont typeface="Wingdings" pitchFamily="2" charset="2"/>
-              <a:buChar char="§"/>
+            <a:pPr marL="0" indent="0" algn="l">
+              <a:buNone/>
             </a:pPr>
             <a:r>
               <a:rPr lang="en-PH" sz="3000" dirty="0"/>
@@ -13333,9 +13328,8 @@
             </a:r>
           </a:p>
           <a:p>
-            <a:pPr algn="l">
-              <a:buFont typeface="Wingdings" pitchFamily="2" charset="2"/>
-              <a:buChar char="§"/>
+            <a:pPr marL="0" indent="0" algn="l">
+              <a:buNone/>
             </a:pPr>
             <a:r>
               <a:rPr lang="en-PH" sz="3000" dirty="0"/>
@@ -13355,9 +13349,8 @@
             </a:r>
           </a:p>
           <a:p>
-            <a:pPr algn="l">
-              <a:buFont typeface="Wingdings" pitchFamily="2" charset="2"/>
-              <a:buChar char="§"/>
+            <a:pPr marL="0" indent="0" algn="l">
+              <a:buNone/>
             </a:pPr>
             <a:endParaRPr lang="en-PH" sz="3000" dirty="0"/>
           </a:p>
@@ -13494,9 +13487,8 @@
           </a:bodyPr>
           <a:lstStyle/>
           <a:p>
-            <a:pPr algn="l">
-              <a:buFont typeface="Wingdings" pitchFamily="2" charset="2"/>
-              <a:buChar char="§"/>
+            <a:pPr marL="0" indent="0" algn="l">
+              <a:buNone/>
             </a:pPr>
             <a:r>
               <a:rPr lang="en-PH" dirty="0"/>
@@ -13516,9 +13508,8 @@
             </a:r>
           </a:p>
           <a:p>
-            <a:pPr algn="l">
-              <a:buFont typeface="Wingdings" pitchFamily="2" charset="2"/>
-              <a:buChar char="§"/>
+            <a:pPr marL="0" indent="0" algn="l">
+              <a:buNone/>
             </a:pPr>
             <a:r>
               <a:rPr lang="en-PH" dirty="0"/>
@@ -13538,9 +13529,8 @@
             </a:r>
           </a:p>
           <a:p>
-            <a:pPr algn="l">
-              <a:buFont typeface="Wingdings" pitchFamily="2" charset="2"/>
-              <a:buChar char="§"/>
+            <a:pPr marL="0" indent="0" algn="l">
+              <a:buNone/>
             </a:pPr>
             <a:r>
               <a:rPr lang="en-PH" dirty="0"/>
@@ -13683,7 +13673,7 @@
         <p:spPr>
           <a:xfrm>
             <a:off x="838199" y="2066736"/>
-            <a:ext cx="6900334" cy="4351338"/>
+            <a:ext cx="6248400" cy="4351338"/>
           </a:xfrm>
         </p:spPr>
         <p:txBody>
@@ -13692,9 +13682,8 @@
           </a:bodyPr>
           <a:lstStyle/>
           <a:p>
-            <a:pPr algn="l">
-              <a:buFont typeface="Wingdings" pitchFamily="2" charset="2"/>
-              <a:buChar char="§"/>
+            <a:pPr marL="0" indent="0" algn="l">
+              <a:buNone/>
             </a:pPr>
             <a:r>
               <a:rPr lang="en-PH" dirty="0"/>
@@ -13708,22 +13697,27 @@
               </a:rPr>
               <a:t>large and diverse datasets produce a better model. </a:t>
             </a:r>
-          </a:p>
-          <a:p>
-            <a:pPr algn="l">
-              <a:buFont typeface="Wingdings" pitchFamily="2" charset="2"/>
-              <a:buChar char="§"/>
+            <a:endParaRPr lang="en-PH" dirty="0"/>
+          </a:p>
+          <a:p>
+            <a:pPr marL="0" indent="0" algn="l">
+              <a:buNone/>
             </a:pPr>
-            <a:endParaRPr lang="en-PH" dirty="0"/>
-          </a:p>
-          <a:p>
-            <a:pPr algn="l">
-              <a:buFont typeface="Wingdings" pitchFamily="2" charset="2"/>
-              <a:buChar char="§"/>
-            </a:pPr>
             <a:r>
               <a:rPr lang="en-PH" dirty="0"/>
-              <a:t>It will allow the model to see more data with a wider range of values and has refined its understanding of the relationship between the features and the label.</a:t>
+              <a:t>It will allow the model to </a:t>
+            </a:r>
+            <a:r>
+              <a:rPr lang="en-PH" b="1" dirty="0">
+                <a:solidFill>
+                  <a:srgbClr val="0070C0"/>
+                </a:solidFill>
+              </a:rPr>
+              <a:t>see more data with a wider range of values </a:t>
+            </a:r>
+            <a:r>
+              <a:rPr lang="en-PH" dirty="0"/>
+              <a:t>and has refined its understanding of the relationship between the features and the label.</a:t>
             </a:r>
           </a:p>
         </p:txBody>
@@ -13850,7 +13844,7 @@
         <p:spPr>
           <a:xfrm>
             <a:off x="838199" y="2066736"/>
-            <a:ext cx="6900334" cy="4351338"/>
+            <a:ext cx="6248400" cy="4351338"/>
           </a:xfrm>
         </p:spPr>
         <p:txBody>
@@ -13859,9 +13853,8 @@
           </a:bodyPr>
           <a:lstStyle/>
           <a:p>
-            <a:pPr algn="l">
-              <a:buFont typeface="Wingdings" pitchFamily="2" charset="2"/>
-              <a:buChar char="§"/>
+            <a:pPr marL="0" indent="0" algn="l">
+              <a:buNone/>
             </a:pPr>
             <a:r>
               <a:rPr lang="en-PH" b="0" i="0" u="none" strike="noStrike" dirty="0">
@@ -13869,27 +13862,36 @@
                   <a:srgbClr val="202124"/>
                 </a:solidFill>
                 <a:effectLst/>
-                <a:latin typeface="Roboto" panose="02000000000000000000" pitchFamily="2" charset="0"/>
               </a:rPr>
-              <a:t>During training, ML practitioners can make subtle adjustments to the configurations and features the model uses to make predictions. </a:t>
-            </a:r>
-          </a:p>
-          <a:p>
-            <a:pPr algn="l">
-              <a:buFont typeface="Wingdings" pitchFamily="2" charset="2"/>
-              <a:buChar char="§"/>
-            </a:pPr>
+              <a:t>During training, ML practitioners </a:t>
+            </a:r>
+            <a:r>
+              <a:rPr lang="en-PH" b="1" i="0" u="none" strike="noStrike" dirty="0">
+                <a:solidFill>
+                  <a:srgbClr val="0070C0"/>
+                </a:solidFill>
+                <a:effectLst/>
+              </a:rPr>
+              <a:t>can make subtle adjustments</a:t>
+            </a:r>
+            <a:r>
+              <a:rPr lang="en-PH" b="0" i="0" u="none" strike="noStrike" dirty="0">
+                <a:solidFill>
+                  <a:srgbClr val="202124"/>
+                </a:solidFill>
+                <a:effectLst/>
+              </a:rPr>
+              <a:t> to the configurations and features the model uses to make predictions. </a:t>
+            </a:r>
             <a:endParaRPr lang="en-PH" dirty="0">
               <a:solidFill>
                 <a:srgbClr val="202124"/>
               </a:solidFill>
-              <a:latin typeface="Roboto" panose="02000000000000000000" pitchFamily="2" charset="0"/>
             </a:endParaRPr>
           </a:p>
           <a:p>
-            <a:pPr algn="l">
-              <a:buFont typeface="Wingdings" pitchFamily="2" charset="2"/>
-              <a:buChar char="§"/>
+            <a:pPr marL="0" indent="0" algn="l">
+              <a:buNone/>
             </a:pPr>
             <a:r>
               <a:rPr lang="en-PH" b="0" i="0" u="none" strike="noStrike" dirty="0">
@@ -13897,19 +13899,36 @@
                   <a:srgbClr val="202124"/>
                 </a:solidFill>
                 <a:effectLst/>
-                <a:latin typeface="Roboto" panose="02000000000000000000" pitchFamily="2" charset="0"/>
               </a:rPr>
-              <a:t>For example, certain features have more predictive power than others. Therefore, ML practitioners can select which features the model uses during training</a:t>
+              <a:t>For example, certain features have more predictive power than others. Therefore, ML practitioners can </a:t>
+            </a:r>
+            <a:r>
+              <a:rPr lang="en-PH" b="1" i="0" u="none" strike="noStrike" dirty="0">
+                <a:solidFill>
+                  <a:srgbClr val="0070C0"/>
+                </a:solidFill>
+                <a:effectLst/>
+              </a:rPr>
+              <a:t>select which features </a:t>
+            </a:r>
+            <a:r>
+              <a:rPr lang="en-PH" b="0" i="0" u="none" strike="noStrike" dirty="0">
+                <a:solidFill>
+                  <a:srgbClr val="202124"/>
+                </a:solidFill>
+                <a:effectLst/>
+              </a:rPr>
+              <a:t>the model uses during training</a:t>
             </a:r>
           </a:p>
         </p:txBody>
       </p:sp>
       <p:pic>
         <p:nvPicPr>
-          <p:cNvPr id="7" name="Picture 6" descr="A diagram of a model and a red box&#10;&#10;Description automatically generated">
-            <a:extLst>
-              <a:ext uri="{FF2B5EF4-FFF2-40B4-BE49-F238E27FC236}">
-                <a16:creationId xmlns:a16="http://schemas.microsoft.com/office/drawing/2014/main" id="{3C822CE9-FA28-9CF4-EA8F-7889F6450363}"/>
+          <p:cNvPr id="4" name="Picture 3" descr="A diagram of a model and a red box&#10;&#10;Description automatically generated">
+            <a:extLst>
+              <a:ext uri="{FF2B5EF4-FFF2-40B4-BE49-F238E27FC236}">
+                <a16:creationId xmlns:a16="http://schemas.microsoft.com/office/drawing/2014/main" id="{C9807D0B-B7D9-01A0-AE3C-4F48DD085D3B}"/>
               </a:ext>
             </a:extLst>
           </p:cNvPr>
@@ -13926,7 +13945,7 @@
         </p:blipFill>
         <p:spPr>
           <a:xfrm>
-            <a:off x="7303567" y="2032869"/>
+            <a:off x="7086599" y="2921479"/>
             <a:ext cx="4888433" cy="1967152"/>
           </a:xfrm>
           <a:prstGeom prst="rect">
@@ -14035,9 +14054,8 @@
           </a:bodyPr>
           <a:lstStyle/>
           <a:p>
-            <a:pPr algn="l">
-              <a:buFont typeface="Wingdings" pitchFamily="2" charset="2"/>
-              <a:buChar char="§"/>
+            <a:pPr marL="0" indent="0" algn="l">
+              <a:buNone/>
             </a:pPr>
             <a:r>
               <a:rPr lang="en-PH" sz="3000" dirty="0"/>
@@ -14045,9 +14063,8 @@
             </a:r>
           </a:p>
           <a:p>
-            <a:pPr algn="l">
-              <a:buFont typeface="Wingdings" pitchFamily="2" charset="2"/>
-              <a:buChar char="§"/>
+            <a:pPr marL="0" indent="0" algn="l">
+              <a:buNone/>
             </a:pPr>
             <a:r>
               <a:rPr lang="en-PH" sz="3000" dirty="0"/>
@@ -14067,9 +14084,8 @@
             </a:r>
           </a:p>
           <a:p>
-            <a:pPr algn="l">
-              <a:buFont typeface="Wingdings" pitchFamily="2" charset="2"/>
-              <a:buChar char="§"/>
+            <a:pPr marL="0" indent="0" algn="l">
+              <a:buNone/>
             </a:pPr>
             <a:r>
               <a:rPr lang="en-PH" sz="3000" dirty="0"/>
@@ -14209,9 +14225,8 @@
           </a:bodyPr>
           <a:lstStyle/>
           <a:p>
-            <a:pPr algn="l">
-              <a:buFont typeface="Wingdings" pitchFamily="2" charset="2"/>
-              <a:buChar char="§"/>
+            <a:pPr marL="0" indent="0" algn="l">
+              <a:buNone/>
             </a:pPr>
             <a:r>
               <a:rPr lang="en-PH" sz="3000" dirty="0"/>
@@ -14231,9 +14246,8 @@
             </a:r>
           </a:p>
           <a:p>
-            <a:pPr algn="l">
-              <a:buFont typeface="Wingdings" pitchFamily="2" charset="2"/>
-              <a:buChar char="§"/>
+            <a:pPr marL="0" indent="0" algn="l">
+              <a:buNone/>
             </a:pPr>
             <a:r>
               <a:rPr lang="en-PH" sz="3000" dirty="0"/>
@@ -14668,8 +14682,8 @@
           </a:p>
         </p:txBody>
       </p:sp>
-      <mc:AlternateContent xmlns:mc="http://schemas.openxmlformats.org/markup-compatibility/2006">
-        <mc:Choice xmlns:a14="http://schemas.microsoft.com/office/drawing/2010/main" Requires="a14">
+      <mc:AlternateContent xmlns:mc="http://schemas.openxmlformats.org/markup-compatibility/2006" xmlns:a14="http://schemas.microsoft.com/office/drawing/2010/main">
+        <mc:Choice Requires="a14">
           <p:sp>
             <p:nvSpPr>
               <p:cNvPr id="3" name="Content Placeholder 2">
@@ -14838,7 +14852,7 @@
             </p:txBody>
           </p:sp>
         </mc:Choice>
-        <mc:Fallback>
+        <mc:Fallback xmlns="">
           <p:sp>
             <p:nvSpPr>
               <p:cNvPr id="3" name="Content Placeholder 2">
@@ -15058,8 +15072,8 @@
           </a:p>
         </p:txBody>
       </p:sp>
-      <mc:AlternateContent xmlns:mc="http://schemas.openxmlformats.org/markup-compatibility/2006">
-        <mc:Choice xmlns:a14="http://schemas.microsoft.com/office/drawing/2010/main" Requires="a14">
+      <mc:AlternateContent xmlns:mc="http://schemas.openxmlformats.org/markup-compatibility/2006" xmlns:a14="http://schemas.microsoft.com/office/drawing/2010/main">
+        <mc:Choice Requires="a14">
           <p:sp>
             <p:nvSpPr>
               <p:cNvPr id="3" name="Content Placeholder 2">
@@ -15304,7 +15318,7 @@
             </p:txBody>
           </p:sp>
         </mc:Choice>
-        <mc:Fallback>
+        <mc:Fallback xmlns="">
           <p:sp>
             <p:nvSpPr>
               <p:cNvPr id="3" name="Content Placeholder 2">
@@ -15585,7 +15599,12 @@
             <p:ph idx="1"/>
           </p:nvPr>
         </p:nvSpPr>
-        <p:spPr/>
+        <p:spPr>
+          <a:xfrm>
+            <a:off x="838200" y="2286869"/>
+            <a:ext cx="6277303" cy="4351338"/>
+          </a:xfrm>
+        </p:spPr>
         <p:txBody>
           <a:bodyPr>
             <a:normAutofit/>
@@ -15615,6 +15634,49 @@
           </a:p>
         </p:txBody>
       </p:sp>
+      <p:pic>
+        <p:nvPicPr>
+          <p:cNvPr id="4" name="Picture 3" descr="A diagram of machine learning&#10;&#10;Description automatically generated">
+            <a:extLst>
+              <a:ext uri="{FF2B5EF4-FFF2-40B4-BE49-F238E27FC236}">
+                <a16:creationId xmlns:a16="http://schemas.microsoft.com/office/drawing/2014/main" id="{13348F4B-92F0-5584-4485-BC39A20B0034}"/>
+              </a:ext>
+            </a:extLst>
+          </p:cNvPr>
+          <p:cNvPicPr>
+            <a:picLocks noChangeAspect="1"/>
+          </p:cNvPicPr>
+          <p:nvPr/>
+        </p:nvPicPr>
+        <p:blipFill>
+          <a:blip r:embed="rId3"/>
+          <a:stretch>
+            <a:fillRect/>
+          </a:stretch>
+        </p:blipFill>
+        <p:spPr>
+          <a:xfrm>
+            <a:off x="7508101" y="1460500"/>
+            <a:ext cx="4440240" cy="4571131"/>
+          </a:xfrm>
+          <a:prstGeom prst="roundRect">
+            <a:avLst>
+              <a:gd name="adj" fmla="val 8594"/>
+            </a:avLst>
+          </a:prstGeom>
+          <a:solidFill>
+            <a:srgbClr val="FFFFFF">
+              <a:shade val="85000"/>
+            </a:srgbClr>
+          </a:solidFill>
+          <a:ln>
+            <a:noFill/>
+          </a:ln>
+          <a:effectLst>
+            <a:reflection blurRad="12700" stA="38000" endPos="28000" dist="5000" dir="5400000" sy="-100000" algn="bl" rotWithShape="0"/>
+          </a:effectLst>
+        </p:spPr>
+      </p:pic>
     </p:spTree>
     <p:extLst>
       <p:ext uri="{BB962C8B-B14F-4D97-AF65-F5344CB8AC3E}">
@@ -15704,10 +15766,15 @@
             <p:ph idx="1"/>
           </p:nvPr>
         </p:nvSpPr>
-        <p:spPr/>
+        <p:spPr>
+          <a:xfrm>
+            <a:off x="838199" y="2151932"/>
+            <a:ext cx="6874934" cy="4351338"/>
+          </a:xfrm>
+        </p:spPr>
         <p:txBody>
           <a:bodyPr>
-            <a:normAutofit lnSpcReduction="10000"/>
+            <a:normAutofit/>
           </a:bodyPr>
           <a:lstStyle/>
           <a:p>
@@ -15749,53 +15816,76 @@
               </a:rPr>
               <a:t>human gives the ML system data with the known correct results</a:t>
             </a:r>
-            <a:r>
-              <a:rPr lang="en-PH" dirty="0"/>
-              <a:t>.</a:t>
-            </a:r>
-          </a:p>
-          <a:p>
-            <a:pPr marL="0" indent="0">
-              <a:buNone/>
-            </a:pPr>
             <a:endParaRPr lang="en-PH" dirty="0"/>
-          </a:p>
-          <a:p>
-            <a:pPr marL="0" indent="0">
-              <a:buNone/>
-            </a:pPr>
-            <a:r>
-              <a:rPr lang="en-PH" dirty="0"/>
-              <a:t>Two of the most common use cases for supervised learning are </a:t>
-            </a:r>
-            <a:r>
-              <a:rPr lang="en-PH" b="1" dirty="0">
-                <a:solidFill>
-                  <a:srgbClr val="0070C0"/>
-                </a:solidFill>
-              </a:rPr>
-              <a:t>regression</a:t>
-            </a:r>
-            <a:r>
-              <a:rPr lang="en-PH" dirty="0"/>
-              <a:t> and </a:t>
-            </a:r>
-            <a:r>
-              <a:rPr lang="en-PH" b="1" dirty="0">
-                <a:solidFill>
-                  <a:srgbClr val="0070C0"/>
-                </a:solidFill>
-              </a:rPr>
-              <a:t>classification</a:t>
-            </a:r>
-            <a:r>
-              <a:rPr lang="en-PH" dirty="0"/>
-              <a:t>.</a:t>
-            </a:r>
-            <a:endParaRPr lang="en-US" dirty="0"/>
           </a:p>
         </p:txBody>
       </p:sp>
+      <p:pic>
+        <p:nvPicPr>
+          <p:cNvPr id="4" name="Picture 3">
+            <a:extLst>
+              <a:ext uri="{FF2B5EF4-FFF2-40B4-BE49-F238E27FC236}">
+                <a16:creationId xmlns:a16="http://schemas.microsoft.com/office/drawing/2014/main" id="{647F00CC-74C0-9865-947D-E1632BFC6D77}"/>
+              </a:ext>
+            </a:extLst>
+          </p:cNvPr>
+          <p:cNvPicPr>
+            <a:picLocks noChangeAspect="1"/>
+          </p:cNvPicPr>
+          <p:nvPr/>
+        </p:nvPicPr>
+        <p:blipFill>
+          <a:blip r:embed="rId3">
+            <a:extLst>
+              <a:ext uri="{28A0092B-C50C-407E-A947-70E740481C1C}">
+                <a14:useLocalDpi xmlns:a14="http://schemas.microsoft.com/office/drawing/2010/main" val="0"/>
+              </a:ext>
+            </a:extLst>
+          </a:blip>
+          <a:stretch>
+            <a:fillRect/>
+          </a:stretch>
+        </p:blipFill>
+        <p:spPr>
+          <a:xfrm>
+            <a:off x="7846112" y="2236599"/>
+            <a:ext cx="3833157" cy="3365087"/>
+          </a:xfrm>
+          <a:prstGeom prst="rect">
+            <a:avLst/>
+          </a:prstGeom>
+          <a:solidFill>
+            <a:srgbClr val="FFFFFF">
+              <a:shade val="85000"/>
+            </a:srgbClr>
+          </a:solidFill>
+          <a:ln w="88900" cap="sq">
+            <a:solidFill>
+              <a:srgbClr val="FFFFFF"/>
+            </a:solidFill>
+            <a:miter lim="800000"/>
+          </a:ln>
+          <a:effectLst>
+            <a:outerShdw blurRad="55000" dist="18000" dir="5400000" algn="tl" rotWithShape="0">
+              <a:srgbClr val="000000">
+                <a:alpha val="40000"/>
+              </a:srgbClr>
+            </a:outerShdw>
+          </a:effectLst>
+          <a:scene3d>
+            <a:camera prst="orthographicFront"/>
+            <a:lightRig rig="twoPt" dir="t">
+              <a:rot lat="0" lon="0" rev="7200000"/>
+            </a:lightRig>
+          </a:scene3d>
+          <a:sp3d>
+            <a:bevelT w="25400" h="19050"/>
+            <a:contourClr>
+              <a:srgbClr val="FFFFFF"/>
+            </a:contourClr>
+          </a:sp3d>
+        </p:spPr>
+      </p:pic>
     </p:spTree>
     <p:extLst>
       <p:ext uri="{BB962C8B-B14F-4D97-AF65-F5344CB8AC3E}">
@@ -15869,8 +15959,8 @@
           </a:p>
         </p:txBody>
       </p:sp>
-      <mc:AlternateContent xmlns:mc="http://schemas.openxmlformats.org/markup-compatibility/2006">
-        <mc:Choice xmlns:a14="http://schemas.microsoft.com/office/drawing/2010/main" Requires="a14">
+      <mc:AlternateContent xmlns:mc="http://schemas.openxmlformats.org/markup-compatibility/2006" xmlns:a14="http://schemas.microsoft.com/office/drawing/2010/main">
+        <mc:Choice Requires="a14">
           <p:sp>
             <p:nvSpPr>
               <p:cNvPr id="3" name="Content Placeholder 2">
@@ -15994,7 +16084,7 @@
             </p:txBody>
           </p:sp>
         </mc:Choice>
-        <mc:Fallback>
+        <mc:Fallback xmlns="">
           <p:sp>
             <p:nvSpPr>
               <p:cNvPr id="3" name="Content Placeholder 2">
@@ -16038,8 +16128,8 @@
           </p:sp>
         </mc:Fallback>
       </mc:AlternateContent>
-      <mc:AlternateContent xmlns:mc="http://schemas.openxmlformats.org/markup-compatibility/2006">
-        <mc:Choice xmlns:a14="http://schemas.microsoft.com/office/drawing/2010/main" Requires="a14">
+      <mc:AlternateContent xmlns:mc="http://schemas.openxmlformats.org/markup-compatibility/2006" xmlns:a14="http://schemas.microsoft.com/office/drawing/2010/main">
+        <mc:Choice Requires="a14">
           <p:sp>
             <p:nvSpPr>
               <p:cNvPr id="5" name="TextBox 4">
@@ -16153,7 +16243,7 @@
             </p:txBody>
           </p:sp>
         </mc:Choice>
-        <mc:Fallback>
+        <mc:Fallback xmlns="">
           <p:sp>
             <p:nvSpPr>
               <p:cNvPr id="5" name="TextBox 4">
@@ -16198,8 +16288,8 @@
           </p:sp>
         </mc:Fallback>
       </mc:AlternateContent>
-      <mc:AlternateContent xmlns:mc="http://schemas.openxmlformats.org/markup-compatibility/2006">
-        <mc:Choice xmlns:a14="http://schemas.microsoft.com/office/drawing/2010/main" Requires="a14">
+      <mc:AlternateContent xmlns:mc="http://schemas.openxmlformats.org/markup-compatibility/2006" xmlns:a14="http://schemas.microsoft.com/office/drawing/2010/main">
+        <mc:Choice Requires="a14">
           <p:sp>
             <p:nvSpPr>
               <p:cNvPr id="7" name="TextBox 6">
@@ -16268,7 +16358,7 @@
             </p:txBody>
           </p:sp>
         </mc:Choice>
-        <mc:Fallback>
+        <mc:Fallback xmlns="">
           <p:sp>
             <p:nvSpPr>
               <p:cNvPr id="7" name="TextBox 6">
@@ -16712,9 +16802,8 @@
           </a:bodyPr>
           <a:lstStyle/>
           <a:p>
-            <a:pPr>
-              <a:buFont typeface="Wingdings" pitchFamily="2" charset="2"/>
-              <a:buChar char="§"/>
+            <a:pPr marL="0" indent="0">
+              <a:buNone/>
             </a:pPr>
             <a:r>
               <a:rPr lang="en-PH" sz="3000" dirty="0"/>
@@ -16726,7 +16815,7 @@
                   <a:srgbClr val="0070C0"/>
                 </a:solidFill>
               </a:rPr>
-              <a:t>predicts a numeric value</a:t>
+              <a:t>predicts a continuous numeric value</a:t>
             </a:r>
             <a:r>
               <a:rPr lang="en-PH" sz="3000" dirty="0"/>
@@ -16734,9 +16823,14 @@
             </a:r>
           </a:p>
           <a:p>
-            <a:pPr>
-              <a:buFont typeface="Wingdings" pitchFamily="2" charset="2"/>
-              <a:buChar char="§"/>
+            <a:pPr marL="0" indent="0">
+              <a:buNone/>
+            </a:pPr>
+            <a:endParaRPr lang="en-PH" sz="3000" dirty="0"/>
+          </a:p>
+          <a:p>
+            <a:pPr marL="0" indent="0">
+              <a:buNone/>
             </a:pPr>
             <a:r>
               <a:rPr lang="en-PH" sz="3000" dirty="0"/>
@@ -16868,18 +16962,17 @@
         <p:spPr>
           <a:xfrm>
             <a:off x="838201" y="2286869"/>
-            <a:ext cx="5257800" cy="4351338"/>
+            <a:ext cx="4792132" cy="4351338"/>
           </a:xfrm>
         </p:spPr>
         <p:txBody>
           <a:bodyPr>
-            <a:normAutofit/>
+            <a:normAutofit lnSpcReduction="10000"/>
           </a:bodyPr>
           <a:lstStyle/>
           <a:p>
-            <a:pPr algn="l">
-              <a:buFont typeface="Wingdings" pitchFamily="2" charset="2"/>
-              <a:buChar char="§"/>
+            <a:pPr marL="0" indent="0" algn="l">
+              <a:buNone/>
             </a:pPr>
             <a:r>
               <a:rPr lang="en-PH" dirty="0"/>
@@ -16887,20 +16980,18 @@
             </a:r>
           </a:p>
           <a:p>
-            <a:pPr algn="l">
-              <a:buFont typeface="Wingdings" pitchFamily="2" charset="2"/>
-              <a:buChar char="§"/>
+            <a:pPr marL="0" indent="0" algn="l">
+              <a:buNone/>
             </a:pPr>
             <a:endParaRPr lang="en-PH" dirty="0"/>
           </a:p>
           <a:p>
-            <a:pPr algn="l">
-              <a:buFont typeface="Wingdings" pitchFamily="2" charset="2"/>
-              <a:buChar char="§"/>
+            <a:pPr marL="0" indent="0" algn="l">
+              <a:buNone/>
             </a:pPr>
             <a:r>
               <a:rPr lang="en-PH" dirty="0"/>
-              <a:t> Unlike regression models, whose output is a number, </a:t>
+              <a:t>Unlike regression models, whose output is a number, </a:t>
             </a:r>
             <a:r>
               <a:rPr lang="en-PH" b="1" dirty="0">
@@ -16916,16 +17007,8 @@
             </a:r>
           </a:p>
           <a:p>
-            <a:pPr algn="l">
-              <a:buFont typeface="Wingdings" pitchFamily="2" charset="2"/>
-              <a:buChar char="§"/>
-            </a:pPr>
-            <a:endParaRPr lang="en-PH" dirty="0"/>
-          </a:p>
-          <a:p>
-            <a:pPr>
-              <a:buFont typeface="Wingdings" pitchFamily="2" charset="2"/>
-              <a:buChar char="§"/>
+            <a:pPr marL="0" indent="0">
+              <a:buNone/>
             </a:pPr>
             <a:endParaRPr lang="en-US" dirty="0"/>
           </a:p>
@@ -16933,10 +17016,10 @@
       </p:sp>
       <p:pic>
         <p:nvPicPr>
-          <p:cNvPr id="3" name="Picture 2" descr="A comparison of a temperature and a temperature&#10;&#10;Description automatically generated">
-            <a:extLst>
-              <a:ext uri="{FF2B5EF4-FFF2-40B4-BE49-F238E27FC236}">
-                <a16:creationId xmlns:a16="http://schemas.microsoft.com/office/drawing/2014/main" id="{787F7780-AA09-CD81-294A-1909BBDDDD6A}"/>
+          <p:cNvPr id="4" name="Picture 3" descr="A comparison of a temperature and a temperature&#10;&#10;Description automatically generated">
+            <a:extLst>
+              <a:ext uri="{FF2B5EF4-FFF2-40B4-BE49-F238E27FC236}">
+                <a16:creationId xmlns:a16="http://schemas.microsoft.com/office/drawing/2014/main" id="{0CEC34F7-779D-294F-4C2E-3F36DDBAAA4F}"/>
               </a:ext>
             </a:extLst>
           </p:cNvPr>
@@ -16953,7 +17036,7 @@
         </p:blipFill>
         <p:spPr>
           <a:xfrm>
-            <a:off x="5726777" y="2151932"/>
+            <a:off x="5516359" y="2608602"/>
             <a:ext cx="6465223" cy="2811407"/>
           </a:xfrm>
           <a:prstGeom prst="rect">

</xml_diff>